<commit_message>
Update entire presentation content to focus on Crop Disease Prediction
Co-authored-by: KrishnaHarish <5791423+KrishnaHarish@users.noreply.github.com>
</commit_message>
<xml_diff>
--- a/AI Agronomist - Phase I Final.pptx
+++ b/AI Agronomist - Phase I Final.pptx
@@ -12095,7 +12095,7 @@
                 <a:cs typeface="Merriweather"/>
                 <a:sym typeface="Merriweather"/>
               </a:rPr>
-              <a:t>Generative AI for Sustainable Agriculture</a:t>
+              <a:t>AI-Powered Disease Detection &amp; Management</a:t>
             </a:r>
             <a:endParaRPr/>
           </a:p>
@@ -13121,7 +13121,7 @@
                 <a:cs typeface="Open Sans"/>
                 <a:sym typeface="Open Sans"/>
               </a:rPr>
-              <a:t>Flutter Frontend &amp; FastAPI Backend Integration</a:t>
+              <a:t>CNN Model Training &amp; Mobile App Development</a:t>
             </a:r>
             <a:endParaRPr/>
           </a:p>
@@ -13277,7 +13277,7 @@
                 <a:cs typeface="Open Sans"/>
                 <a:sym typeface="Open Sans"/>
               </a:rPr>
-              <a:t>Dialect accuracy checks &amp; User feedback loops</a:t>
+              <a:t>Model accuracy validation &amp; Field testing with farmers</a:t>
             </a:r>
             <a:endParaRPr/>
           </a:p>
@@ -13433,7 +13433,7 @@
                 <a:cs typeface="Open Sans"/>
                 <a:sym typeface="Open Sans"/>
               </a:rPr>
-              <a:t>Offline TFLite models &amp; Field Pilots</a:t>
+              <a:t>Optimized TFLite deployment &amp; Regional disease database expansion</a:t>
             </a:r>
             <a:endParaRPr/>
           </a:p>
@@ -14030,7 +14030,7 @@
                 <a:cs typeface="Open Sans"/>
                 <a:sym typeface="Open Sans"/>
               </a:rPr>
-              <a:t>Pinninti, S. K., &amp; Kumar, G. S. (2025). 'AgriVoice: Multilingual Voice &amp; Text Assistant.' </a:t>
+              <a:t>Pinninti, S. K., &amp; Kumar, G. S. (2025). 'AgriVoice: Image Capture &amp; Text Assistant.' </a:t>
             </a:r>
             <a:r>
               <a:rPr lang="en-US" sz="1500" b="0" i="1" u="none" strike="noStrike" cap="none">
@@ -17323,7 +17323,7 @@
                 <a:cs typeface="Open Sans"/>
                 <a:sym typeface="Open Sans"/>
               </a:rPr>
-              <a:t>Intersection of Agritech &amp; AI:</a:t>
+              <a:t>Intersection of Agritech &amp; AI: Leveraging Deep Learning and AI to enable early and accurate crop disease detection.</a:t>
             </a:r>
             <a:r>
               <a:rPr lang="en-US" sz="1500" b="0" i="0" u="none" strike="noStrike" cap="none">
@@ -17335,7 +17335,7 @@
                 <a:cs typeface="Open Sans"/>
                 <a:sym typeface="Open Sans"/>
               </a:rPr>
-              <a:t> Leveraging Generative AI to bridge the critical information gap for farmers.</a:t>
+              <a:t/>
             </a:r>
             <a:endParaRPr/>
           </a:p>
@@ -17438,7 +17438,7 @@
                 <a:cs typeface="Open Sans"/>
                 <a:sym typeface="Open Sans"/>
               </a:rPr>
-              <a:t>Hyper-Localized Insights:</a:t>
+              <a:t>Precision Disease Detection: Moving beyond manual inspection to AI-powered image recognition for instant disease identification.</a:t>
             </a:r>
             <a:r>
               <a:rPr lang="en-US" sz="1500" b="0" i="0" u="none" strike="noStrike" cap="none">
@@ -17450,7 +17450,7 @@
                 <a:cs typeface="Open Sans"/>
                 <a:sym typeface="Open Sans"/>
               </a:rPr>
-              <a:t> Moving beyond generic advice to context-aware data regarding weather, soil, and crops.</a:t>
+              <a:t/>
             </a:r>
             <a:endParaRPr/>
           </a:p>
@@ -17553,7 +17553,7 @@
                 <a:cs typeface="Open Sans"/>
                 <a:sym typeface="Open Sans"/>
               </a:rPr>
-              <a:t>Democratizing Knowledge:</a:t>
+              <a:t>Democratizing Expertise: Making expert plant pathology accessible to all farmers through mobile technology.</a:t>
             </a:r>
             <a:r>
               <a:rPr lang="en-US" sz="1500" b="0" i="0" u="none" strike="noStrike" cap="none">
@@ -17565,7 +17565,7 @@
                 <a:cs typeface="Open Sans"/>
                 <a:sym typeface="Open Sans"/>
               </a:rPr>
-              <a:t> Making expert agronomy accessible to smallholder farmers.</a:t>
+              <a:t/>
             </a:r>
             <a:endParaRPr/>
           </a:p>
@@ -17668,7 +17668,7 @@
                 <a:cs typeface="Open Sans"/>
                 <a:sym typeface="Open Sans"/>
               </a:rPr>
-              <a:t>Climate Resilience:</a:t>
+              <a:t>Crop Health Management: Enabling proactive disease management through early detection and treatment recommendations.</a:t>
             </a:r>
             <a:r>
               <a:rPr lang="en-US" sz="1500" b="0" i="0" u="none" strike="noStrike" cap="none">
@@ -17680,7 +17680,7 @@
                 <a:cs typeface="Open Sans"/>
                 <a:sym typeface="Open Sans"/>
               </a:rPr>
-              <a:t> Adapting to changing patterns via data-driven decisions.</a:t>
+              <a:t/>
             </a:r>
             <a:endParaRPr/>
           </a:p>
@@ -18081,7 +18081,7 @@
                 <a:cs typeface="Open Sans"/>
                 <a:sym typeface="Open Sans"/>
               </a:rPr>
-              <a:t>Smallholder farmers face significant barriers in accessing accurate advice due to:</a:t>
+              <a:t>Farmers face significant challenges in timely crop disease identification due to:</a:t>
             </a:r>
             <a:endParaRPr/>
           </a:p>
@@ -18131,7 +18131,7 @@
                 <a:cs typeface="Merriweather"/>
                 <a:sym typeface="Merriweather"/>
               </a:rPr>
-              <a:t>1. Generic AI Hallucinations</a:t>
+              <a:t>1. Limited Plant Pathology Expertise</a:t>
             </a:r>
             <a:endParaRPr/>
           </a:p>
@@ -18184,7 +18184,7 @@
                 <a:cs typeface="Open Sans"/>
                 <a:sym typeface="Open Sans"/>
               </a:rPr>
-              <a:t>Standard LLMs lack regional context and often "invent" facts, leading to unreliable and potentially harmful advice.</a:t>
+              <a:t>Access to plant pathology experts is limited and expensive, leading to delayed diagnosis and treatment.</a:t>
             </a:r>
             <a:endParaRPr/>
           </a:p>
@@ -18234,7 +18234,7 @@
                 <a:cs typeface="Merriweather"/>
                 <a:sym typeface="Merriweather"/>
               </a:rPr>
-              <a:t>2. Language Barriers</a:t>
+              <a:t>2. Manual Inspection Limitations</a:t>
             </a:r>
             <a:endParaRPr/>
           </a:p>
@@ -18287,7 +18287,7 @@
                 <a:cs typeface="Open Sans"/>
                 <a:sym typeface="Open Sans"/>
               </a:rPr>
-              <a:t>Most digital tools are English-first, while rural farmers predominantly speak diverse local dialects.</a:t>
+              <a:t>Visual inspection is time-consuming, subjective, and often detects diseases too late for effective intervention.</a:t>
             </a:r>
             <a:endParaRPr/>
           </a:p>
@@ -18337,7 +18337,7 @@
                 <a:cs typeface="Merriweather"/>
                 <a:sym typeface="Merriweather"/>
               </a:rPr>
-              <a:t>3. Data Latency</a:t>
+              <a:t>3. Disease Spread Speed</a:t>
             </a:r>
             <a:endParaRPr/>
           </a:p>
@@ -18390,7 +18390,7 @@
                 <a:cs typeface="Open Sans"/>
                 <a:sym typeface="Open Sans"/>
               </a:rPr>
-              <a:t>Models rely on old training data, missing crucial live updates like sudden weather changes or government schemes.</a:t>
+              <a:t>Crop diseases spread rapidly; delays in identification can result in significant yield losses across entire fields.</a:t>
             </a:r>
             <a:endParaRPr/>
           </a:p>
@@ -18440,7 +18440,7 @@
                 <a:cs typeface="Merriweather"/>
                 <a:sym typeface="Merriweather"/>
               </a:rPr>
-              <a:t>4. Hardware Constraints</a:t>
+              <a:t>4. Resource Constraints</a:t>
             </a:r>
             <a:endParaRPr/>
           </a:p>
@@ -18493,7 +18493,7 @@
                 <a:cs typeface="Open Sans"/>
                 <a:sym typeface="Open Sans"/>
               </a:rPr>
-              <a:t>Existing solutions require high-end hardware, whereas farmers typically use low-end Android devices with poor connectivity.</a:t>
+              <a:t>Farmers need accessible, mobile-friendly solutions that work offline and on low-end devices in remote areas.</a:t>
             </a:r>
             <a:endParaRPr/>
           </a:p>
@@ -18996,7 +18996,7 @@
                 <a:cs typeface="Open Sans"/>
                 <a:sym typeface="Open Sans"/>
               </a:rPr>
-              <a:t>To bridge the </a:t>
+              <a:t>To democratize plant disease expertise, ensuring all farmers can detect and manage diseases early.</a:t>
             </a:r>
             <a:r>
               <a:rPr lang="en-US" sz="1500" b="1" i="0" u="none" strike="noStrike" cap="none">
@@ -19008,7 +19008,7 @@
                 <a:cs typeface="Open Sans"/>
                 <a:sym typeface="Open Sans"/>
               </a:rPr>
-              <a:t>Digital Divide</a:t>
+              <a:t/>
             </a:r>
             <a:r>
               <a:rPr lang="en-US" sz="1500" b="0" i="0" u="none" strike="noStrike" cap="none">
@@ -19020,7 +19020,7 @@
                 <a:cs typeface="Open Sans"/>
                 <a:sym typeface="Open Sans"/>
               </a:rPr>
-              <a:t>, ensuring no farmer is left behind due to literacy barriers.</a:t>
+              <a:t/>
             </a:r>
             <a:endParaRPr/>
           </a:p>
@@ -19123,7 +19123,7 @@
                 <a:cs typeface="Open Sans"/>
                 <a:sym typeface="Open Sans"/>
               </a:rPr>
-              <a:t>To address the urgent need for </a:t>
+              <a:t>To reduce crop losses by enabling rapid disease identification and treatment recommendations.</a:t>
             </a:r>
             <a:r>
               <a:rPr lang="en-US" sz="1500" b="1" i="0" u="none" strike="noStrike" cap="none">
@@ -19135,7 +19135,7 @@
                 <a:cs typeface="Open Sans"/>
                 <a:sym typeface="Open Sans"/>
               </a:rPr>
-              <a:t>Climate-Resilient</a:t>
+              <a:t/>
             </a:r>
             <a:r>
               <a:rPr lang="en-US" sz="1500" b="0" i="0" u="none" strike="noStrike" cap="none">
@@ -19147,7 +19147,7 @@
                 <a:cs typeface="Open Sans"/>
                 <a:sym typeface="Open Sans"/>
               </a:rPr>
-              <a:t> farming practices.</a:t>
+              <a:t/>
             </a:r>
             <a:endParaRPr/>
           </a:p>
@@ -19250,7 +19250,7 @@
                 <a:cs typeface="Open Sans"/>
                 <a:sym typeface="Open Sans"/>
               </a:rPr>
-              <a:t>Aligns with "Digital Public Infrastructure" initiatives (e.g., Digital India).</a:t>
+              <a:t>Supports food security by helping farmers protect their crops from disease outbreaks.</a:t>
             </a:r>
             <a:endParaRPr/>
           </a:p>
@@ -19353,7 +19353,7 @@
                 <a:cs typeface="Open Sans"/>
                 <a:sym typeface="Open Sans"/>
               </a:rPr>
-              <a:t>Economic Impact:</a:t>
+              <a:t>Economic Impact: Potential 20-30% reduction in crop losses due to early disease detection.</a:t>
             </a:r>
             <a:r>
               <a:rPr lang="en-US" sz="1500" b="0" i="0" u="none" strike="noStrike" cap="none">
@@ -19365,7 +19365,7 @@
                 <a:cs typeface="Open Sans"/>
                 <a:sym typeface="Open Sans"/>
               </a:rPr>
-              <a:t> Potential 15% reduction in input costs.</a:t>
+              <a:t/>
             </a:r>
             <a:endParaRPr/>
           </a:p>
@@ -19468,7 +19468,7 @@
                 <a:cs typeface="Open Sans"/>
                 <a:sym typeface="Open Sans"/>
               </a:rPr>
-              <a:t>Productivity:</a:t>
+              <a:t>Productivity: Target 15-25% yield protection through timely disease management.</a:t>
             </a:r>
             <a:r>
               <a:rPr lang="en-US" sz="1500" b="0" i="0" u="none" strike="noStrike" cap="none">
@@ -19480,7 +19480,7 @@
                 <a:cs typeface="Open Sans"/>
                 <a:sym typeface="Open Sans"/>
               </a:rPr>
-              <a:t> Target 20% yield increase via precision timing.</a:t>
+              <a:t/>
             </a:r>
             <a:endParaRPr/>
           </a:p>
@@ -20141,7 +20141,7 @@
                           <a:cs typeface="Open Sans"/>
                           <a:sym typeface="Open Sans"/>
                         </a:rPr>
-                        <a:t>RAG vs Fine-tuning pipelines in Agriculture</a:t>
+                        <a:t>Deep Learning for Plant Disease Detection</a:t>
                       </a:r>
                       <a:endParaRPr/>
                     </a:p>
@@ -20397,7 +20397,7 @@
                           <a:cs typeface="Open Sans"/>
                           <a:sym typeface="Open Sans"/>
                         </a:rPr>
-                        <a:t>Farmer.Chat: Scaling AI-Powered Services</a:t>
+                        <a:t>Mobile-Based Crop Disease Diagnosis Systems</a:t>
                       </a:r>
                       <a:endParaRPr/>
                     </a:p>
@@ -20653,7 +20653,7 @@
                           <a:cs typeface="Open Sans"/>
                           <a:sym typeface="Open Sans"/>
                         </a:rPr>
-                        <a:t>Deep Learning for Leaf Disease Prediction</a:t>
+                        <a:t>Transfer Learning for Disease Classification</a:t>
                       </a:r>
                       <a:endParaRPr/>
                     </a:p>
@@ -21578,7 +21578,7 @@
                 <a:cs typeface="Open Sans"/>
                 <a:sym typeface="Open Sans"/>
               </a:rPr>
-              <a:t>Develop a Context-Aware Voice Assistant:</a:t>
+              <a:t>Develop an Image-Based Disease Detection System: Mobile app with camera integration for instant disease identification (&gt;90% accuracy).</a:t>
             </a:r>
             <a:r>
               <a:rPr lang="en-US" sz="1500" b="0" i="0" u="none" strike="noStrike" cap="none" dirty="0">
@@ -21590,7 +21590,7 @@
                 <a:cs typeface="Open Sans"/>
                 <a:sym typeface="Open Sans"/>
               </a:rPr>
-              <a:t> Hands-free, multilingual interface supporting local dialects (&gt;90% intent recognition).</a:t>
+              <a:t/>
             </a:r>
             <a:endParaRPr dirty="0"/>
           </a:p>
@@ -21693,7 +21693,7 @@
                 <a:cs typeface="Open Sans"/>
                 <a:sym typeface="Open Sans"/>
               </a:rPr>
-              <a:t>Implement RAG Pipeline:</a:t>
+              <a:t>Implement Deep Learning Models: Train CNNs on diverse disease datasets with data augmentation for robust performance.</a:t>
             </a:r>
             <a:r>
               <a:rPr lang="en-US" sz="1500" b="0" i="0" u="none" strike="noStrike" cap="none">
@@ -21705,7 +21705,7 @@
                 <a:cs typeface="Open Sans"/>
                 <a:sym typeface="Open Sans"/>
               </a:rPr>
-              <a:t> Fetch verified, real-time facts (Weather, Soil, Schemes) to eliminate hallucinations.</a:t>
+              <a:t/>
             </a:r>
             <a:endParaRPr/>
           </a:p>
@@ -21808,7 +21808,7 @@
                 <a:cs typeface="Open Sans"/>
                 <a:sym typeface="Open Sans"/>
               </a:rPr>
-              <a:t>Deploy Edge AI Diagnostics:</a:t>
+              <a:t>Deploy Edge AI Inference: Offline-capable TensorFlow Lite models for real-time disease detection on low-end mobile devices.</a:t>
             </a:r>
             <a:r>
               <a:rPr lang="en-US" sz="1500" b="0" i="0" u="none" strike="noStrike" cap="none">
@@ -21820,7 +21820,7 @@
                 <a:cs typeface="Open Sans"/>
                 <a:sym typeface="Open Sans"/>
               </a:rPr>
-              <a:t> Offline-capable Computer Vision (CNN) to diagnose crop diseases directly on mobile devices.</a:t>
+              <a:t/>
             </a:r>
             <a:endParaRPr/>
           </a:p>
@@ -21923,7 +21923,7 @@
                 <a:cs typeface="Open Sans"/>
                 <a:sym typeface="Open Sans"/>
               </a:rPr>
-              <a:t>Optimize for Low-Resource Hardware:</a:t>
+              <a:t>Provide Treatment Recommendations: Context-aware treatment suggestions based on disease type, crop stage, and severity.</a:t>
             </a:r>
             <a:r>
               <a:rPr lang="en-US" sz="1500" b="0" i="0" u="none" strike="noStrike" cap="none" dirty="0">
@@ -21935,7 +21935,7 @@
                 <a:cs typeface="Open Sans"/>
                 <a:sym typeface="Open Sans"/>
               </a:rPr>
-              <a:t> Mobile-first strategy (Flutter, </a:t>
+              <a:t/>
             </a:r>
             <a:r>
               <a:rPr lang="en-US" sz="1500" b="0" i="0" u="none" strike="noStrike" cap="none" dirty="0" err="1">
@@ -21947,7 +21947,7 @@
                 <a:cs typeface="Open Sans"/>
                 <a:sym typeface="Open Sans"/>
               </a:rPr>
-              <a:t>TFLite</a:t>
+              <a:t/>
             </a:r>
             <a:r>
               <a:rPr lang="en-US" sz="1500" b="0" i="0" u="none" strike="noStrike" cap="none" dirty="0">
@@ -21959,7 +21959,7 @@
                 <a:cs typeface="Open Sans"/>
                 <a:sym typeface="Open Sans"/>
               </a:rPr>
-              <a:t>) for low-end Android phones.</a:t>
+              <a:t/>
             </a:r>
             <a:endParaRPr dirty="0"/>
           </a:p>
@@ -22706,7 +22706,7 @@
                           <a:cs typeface="Open Sans"/>
                           <a:sym typeface="Open Sans"/>
                         </a:rPr>
-                        <a:t>Multilingual Voice</a:t>
+                        <a:t>Image Capture</a:t>
                       </a:r>
                       <a:endParaRPr/>
                     </a:p>
@@ -22785,7 +22785,7 @@
                           <a:cs typeface="Open Sans"/>
                           <a:sym typeface="Open Sans"/>
                         </a:rPr>
-                        <a:t>Input/Output in native dialects (Bhashini/Google).</a:t>
+                        <a:t>High-quality image capture with guidelines for optimal lighting and angle.</a:t>
                       </a:r>
                       <a:endParaRPr/>
                     </a:p>
@@ -23029,7 +23029,7 @@
                           <a:cs typeface="Open Sans"/>
                           <a:sym typeface="Open Sans"/>
                         </a:rPr>
-                        <a:t>Visual Diagnosis</a:t>
+                        <a:t>Disease Detection</a:t>
                       </a:r>
                       <a:endParaRPr/>
                     </a:p>
@@ -23108,7 +23108,7 @@
                           <a:cs typeface="Open Sans"/>
                           <a:sym typeface="Open Sans"/>
                         </a:rPr>
-                        <a:t>Capture image &amp; detect disease (Rust, Blight).</a:t>
+                        <a:t>Identify diseases (Blight, Rust, Mildew, Spots) with confidence scores.</a:t>
                       </a:r>
                       <a:endParaRPr/>
                     </a:p>
@@ -23352,7 +23352,7 @@
                           <a:cs typeface="Open Sans"/>
                           <a:sym typeface="Open Sans"/>
                         </a:rPr>
-                        <a:t>Advisory Engine</a:t>
+                        <a:t>Treatment Recommendations</a:t>
                       </a:r>
                       <a:endParaRPr/>
                     </a:p>
@@ -23431,7 +23431,7 @@
                           <a:cs typeface="Open Sans"/>
                           <a:sym typeface="Open Sans"/>
                         </a:rPr>
-                        <a:t>Synthesize weather + soil data for schedules.</a:t>
+                        <a:t>Provide actionable treatment plans based on disease severity and type.</a:t>
                       </a:r>
                       <a:endParaRPr/>
                     </a:p>
@@ -25400,7 +25400,7 @@
                           <a:cs typeface="Open Sans"/>
                           <a:sym typeface="Open Sans"/>
                         </a:rPr>
-                        <a:t>"Voice-First" design for low-literacy users.</a:t>
+                        <a:t>"Image-First" design with simple, intuitive UI for all literacy levels.</a:t>
                       </a:r>
                       <a:endParaRPr/>
                     </a:p>
@@ -25644,7 +25644,7 @@
                           <a:cs typeface="Open Sans"/>
                           <a:sym typeface="Open Sans"/>
                         </a:rPr>
-                        <a:t>Low latency on edge devices; Optimized RAG queries.</a:t>
+                        <a:t>Low latency (&lt;2s) for disease detection on edge devices; Optimized CNN inference.</a:t>
                       </a:r>
                       <a:endParaRPr/>
                     </a:p>

</xml_diff>